<commit_message>
complete presentation schematic about project
</commit_message>
<xml_diff>
--- a/Prezentacja_splotowa_filtracja_obrazu.pptx
+++ b/Prezentacja_splotowa_filtracja_obrazu.pptx
@@ -125,6 +125,32 @@
     </a:lvl9pPr>
   </p:defaultTextStyle>
   <p:extLst>
+    <p:ext uri="{521415D9-36F7-43E2-AB2F-B90AF26B5E84}">
+      <p14:sectionLst xmlns:p14="http://schemas.microsoft.com/office/powerpoint/2010/main">
+        <p14:section name="Sekcja domyślna" id="{F49354BC-1534-4371-9642-8FA6AF8561D4}">
+          <p14:sldIdLst>
+            <p14:sldId id="256"/>
+            <p14:sldId id="265"/>
+            <p14:sldId id="257"/>
+            <p14:sldId id="258"/>
+            <p14:sldId id="259"/>
+            <p14:sldId id="260"/>
+            <p14:sldId id="261"/>
+            <p14:sldId id="262"/>
+            <p14:sldId id="263"/>
+            <p14:sldId id="264"/>
+            <p14:sldId id="266"/>
+            <p14:sldId id="267"/>
+            <p14:sldId id="268"/>
+            <p14:sldId id="269"/>
+            <p14:sldId id="270"/>
+            <p14:sldId id="271"/>
+            <p14:sldId id="272"/>
+            <p14:sldId id="273"/>
+          </p14:sldIdLst>
+        </p14:section>
+      </p14:sectionLst>
+    </p:ext>
     <p:ext uri="{EFAFB233-063F-42B5-8137-9DF3F51BA10A}">
       <p15:sldGuideLst xmlns:p15="http://schemas.microsoft.com/office/powerpoint/2012/main"/>
     </p:ext>
@@ -214,7 +240,7 @@
           <a:p>
             <a:fld id="{53BFE8A1-00DC-4AA4-BB70-09A86B00B079}" type="datetimeFigureOut">
               <a:rPr lang="pl-PL" smtClean="0"/>
-              <a:t>07.05.2023</a:t>
+              <a:t>08.05.2023</a:t>
             </a:fld>
             <a:endParaRPr lang="pl-PL"/>
           </a:p>
@@ -628,7 +654,7 @@
           <a:p>
             <a:fld id="{0F5BA0DB-EAFB-491B-B414-7F15544FAA91}" type="datetimeFigureOut">
               <a:rPr lang="pl-PL" smtClean="0"/>
-              <a:t>07.05.2023</a:t>
+              <a:t>08.05.2023</a:t>
             </a:fld>
             <a:endParaRPr lang="pl-PL"/>
           </a:p>
@@ -826,7 +852,7 @@
           <a:p>
             <a:fld id="{0F5BA0DB-EAFB-491B-B414-7F15544FAA91}" type="datetimeFigureOut">
               <a:rPr lang="pl-PL" smtClean="0"/>
-              <a:t>07.05.2023</a:t>
+              <a:t>08.05.2023</a:t>
             </a:fld>
             <a:endParaRPr lang="pl-PL"/>
           </a:p>
@@ -1034,7 +1060,7 @@
           <a:p>
             <a:fld id="{0F5BA0DB-EAFB-491B-B414-7F15544FAA91}" type="datetimeFigureOut">
               <a:rPr lang="pl-PL" smtClean="0"/>
-              <a:t>07.05.2023</a:t>
+              <a:t>08.05.2023</a:t>
             </a:fld>
             <a:endParaRPr lang="pl-PL"/>
           </a:p>
@@ -1232,7 +1258,7 @@
           <a:p>
             <a:fld id="{0F5BA0DB-EAFB-491B-B414-7F15544FAA91}" type="datetimeFigureOut">
               <a:rPr lang="pl-PL" smtClean="0"/>
-              <a:t>07.05.2023</a:t>
+              <a:t>08.05.2023</a:t>
             </a:fld>
             <a:endParaRPr lang="pl-PL"/>
           </a:p>
@@ -1507,7 +1533,7 @@
           <a:p>
             <a:fld id="{0F5BA0DB-EAFB-491B-B414-7F15544FAA91}" type="datetimeFigureOut">
               <a:rPr lang="pl-PL" smtClean="0"/>
-              <a:t>07.05.2023</a:t>
+              <a:t>08.05.2023</a:t>
             </a:fld>
             <a:endParaRPr lang="pl-PL"/>
           </a:p>
@@ -1772,7 +1798,7 @@
           <a:p>
             <a:fld id="{0F5BA0DB-EAFB-491B-B414-7F15544FAA91}" type="datetimeFigureOut">
               <a:rPr lang="pl-PL" smtClean="0"/>
-              <a:t>07.05.2023</a:t>
+              <a:t>08.05.2023</a:t>
             </a:fld>
             <a:endParaRPr lang="pl-PL"/>
           </a:p>
@@ -2184,7 +2210,7 @@
           <a:p>
             <a:fld id="{0F5BA0DB-EAFB-491B-B414-7F15544FAA91}" type="datetimeFigureOut">
               <a:rPr lang="pl-PL" smtClean="0"/>
-              <a:t>07.05.2023</a:t>
+              <a:t>08.05.2023</a:t>
             </a:fld>
             <a:endParaRPr lang="pl-PL"/>
           </a:p>
@@ -2325,7 +2351,7 @@
           <a:p>
             <a:fld id="{0F5BA0DB-EAFB-491B-B414-7F15544FAA91}" type="datetimeFigureOut">
               <a:rPr lang="pl-PL" smtClean="0"/>
-              <a:t>07.05.2023</a:t>
+              <a:t>08.05.2023</a:t>
             </a:fld>
             <a:endParaRPr lang="pl-PL"/>
           </a:p>
@@ -2438,7 +2464,7 @@
           <a:p>
             <a:fld id="{0F5BA0DB-EAFB-491B-B414-7F15544FAA91}" type="datetimeFigureOut">
               <a:rPr lang="pl-PL" smtClean="0"/>
-              <a:t>07.05.2023</a:t>
+              <a:t>08.05.2023</a:t>
             </a:fld>
             <a:endParaRPr lang="pl-PL"/>
           </a:p>
@@ -2749,7 +2775,7 @@
           <a:p>
             <a:fld id="{0F5BA0DB-EAFB-491B-B414-7F15544FAA91}" type="datetimeFigureOut">
               <a:rPr lang="pl-PL" smtClean="0"/>
-              <a:t>07.05.2023</a:t>
+              <a:t>08.05.2023</a:t>
             </a:fld>
             <a:endParaRPr lang="pl-PL"/>
           </a:p>
@@ -3037,7 +3063,7 @@
           <a:p>
             <a:fld id="{0F5BA0DB-EAFB-491B-B414-7F15544FAA91}" type="datetimeFigureOut">
               <a:rPr lang="pl-PL" smtClean="0"/>
-              <a:t>07.05.2023</a:t>
+              <a:t>08.05.2023</a:t>
             </a:fld>
             <a:endParaRPr lang="pl-PL"/>
           </a:p>
@@ -3278,7 +3304,7 @@
           <a:p>
             <a:fld id="{0F5BA0DB-EAFB-491B-B414-7F15544FAA91}" type="datetimeFigureOut">
               <a:rPr lang="pl-PL" smtClean="0"/>
-              <a:t>07.05.2023</a:t>
+              <a:t>08.05.2023</a:t>
             </a:fld>
             <a:endParaRPr lang="pl-PL"/>
           </a:p>
@@ -15873,11 +15899,8 @@
             <a:pPr algn="ctr"/>
             <a:r>
               <a:rPr lang="pl-PL" dirty="0"/>
-              <a:t>BRAM 2 port 4x4 piksele (4bajty*16)</a:t>
-            </a:r>
-          </a:p>
-          <a:p>
-            <a:pPr algn="ctr"/>
+              <a:t>BRAM 2 port 3x4 piksele </a:t>
+            </a:r>
             <a:r>
               <a:rPr lang="pl-PL" dirty="0" err="1"/>
               <a:t>Input_matrix</a:t>
@@ -16192,8 +16215,8 @@
         </p:nvSpPr>
         <p:spPr>
           <a:xfrm>
-            <a:off x="6660497" y="5063557"/>
-            <a:ext cx="1498434" cy="1405939"/>
+            <a:off x="6651153" y="5418714"/>
+            <a:ext cx="853486" cy="1405939"/>
           </a:xfrm>
           <a:prstGeom prst="rightArrow">
             <a:avLst/>
@@ -16251,8 +16274,8 @@
         </p:nvSpPr>
         <p:spPr>
           <a:xfrm>
-            <a:off x="8196406" y="4870259"/>
-            <a:ext cx="2119118" cy="1588958"/>
+            <a:off x="7549339" y="5406129"/>
+            <a:ext cx="1737776" cy="1374826"/>
           </a:xfrm>
           <a:prstGeom prst="rect">
             <a:avLst/>
@@ -16433,7 +16456,7 @@
           <p:nvPr>
             <p:extLst>
               <p:ext uri="{D42A27DB-BD31-4B8C-83A1-F6EECF244321}">
-                <p14:modId xmlns:p14="http://schemas.microsoft.com/office/powerpoint/2010/main" val="3529794055"/>
+                <p14:modId xmlns:p14="http://schemas.microsoft.com/office/powerpoint/2010/main" val="4262680006"/>
               </p:ext>
             </p:extLst>
           </p:nvPr>
@@ -16899,6 +16922,1412 @@
           </a:fontRef>
         </p:style>
       </p:cxnSp>
+      <p:sp>
+        <p:nvSpPr>
+          <p:cNvPr id="3" name="Prostokąt 2">
+            <a:extLst>
+              <a:ext uri="{FF2B5EF4-FFF2-40B4-BE49-F238E27FC236}">
+                <a16:creationId xmlns:a16="http://schemas.microsoft.com/office/drawing/2014/main" id="{327DDED2-A400-D588-FE6B-31DBA80952B2}"/>
+              </a:ext>
+            </a:extLst>
+          </p:cNvPr>
+          <p:cNvSpPr/>
+          <p:nvPr/>
+        </p:nvSpPr>
+        <p:spPr>
+          <a:xfrm rot="16200000">
+            <a:off x="10627494" y="3681965"/>
+            <a:ext cx="645712" cy="471749"/>
+          </a:xfrm>
+          <a:prstGeom prst="rect">
+            <a:avLst/>
+          </a:prstGeom>
+        </p:spPr>
+        <p:style>
+          <a:lnRef idx="2">
+            <a:schemeClr val="accent1">
+              <a:shade val="50000"/>
+            </a:schemeClr>
+          </a:lnRef>
+          <a:fillRef idx="1">
+            <a:schemeClr val="accent1"/>
+          </a:fillRef>
+          <a:effectRef idx="0">
+            <a:schemeClr val="accent1"/>
+          </a:effectRef>
+          <a:fontRef idx="minor">
+            <a:schemeClr val="lt1"/>
+          </a:fontRef>
+        </p:style>
+        <p:txBody>
+          <a:bodyPr rtlCol="0" anchor="ctr"/>
+          <a:lstStyle/>
+          <a:p>
+            <a:pPr algn="ctr"/>
+            <a:r>
+              <a:rPr lang="pl-PL" dirty="0"/>
+              <a:t>FIFO</a:t>
+            </a:r>
+          </a:p>
+        </p:txBody>
+      </p:sp>
+      <p:sp>
+        <p:nvSpPr>
+          <p:cNvPr id="14" name="Strzałka: w prawo 13">
+            <a:extLst>
+              <a:ext uri="{FF2B5EF4-FFF2-40B4-BE49-F238E27FC236}">
+                <a16:creationId xmlns:a16="http://schemas.microsoft.com/office/drawing/2014/main" id="{AA2501C2-CF3A-85A0-69A9-A929C421FCA1}"/>
+              </a:ext>
+            </a:extLst>
+          </p:cNvPr>
+          <p:cNvSpPr/>
+          <p:nvPr/>
+        </p:nvSpPr>
+        <p:spPr>
+          <a:xfrm rot="16200000">
+            <a:off x="10791045" y="3305571"/>
+            <a:ext cx="318608" cy="312490"/>
+          </a:xfrm>
+          <a:prstGeom prst="rightArrow">
+            <a:avLst/>
+          </a:prstGeom>
+          <a:solidFill>
+            <a:schemeClr val="accent2">
+              <a:lumMod val="40000"/>
+              <a:lumOff val="60000"/>
+            </a:schemeClr>
+          </a:solidFill>
+        </p:spPr>
+        <p:style>
+          <a:lnRef idx="2">
+            <a:schemeClr val="accent1">
+              <a:shade val="50000"/>
+            </a:schemeClr>
+          </a:lnRef>
+          <a:fillRef idx="1">
+            <a:schemeClr val="accent1"/>
+          </a:fillRef>
+          <a:effectRef idx="0">
+            <a:schemeClr val="accent1"/>
+          </a:effectRef>
+          <a:fontRef idx="minor">
+            <a:schemeClr val="lt1"/>
+          </a:fontRef>
+        </p:style>
+        <p:txBody>
+          <a:bodyPr rtlCol="0" anchor="ctr"/>
+          <a:lstStyle/>
+          <a:p>
+            <a:pPr algn="ctr"/>
+            <a:endParaRPr lang="pl-PL" sz="1100" dirty="0">
+              <a:solidFill>
+                <a:schemeClr val="tx1"/>
+              </a:solidFill>
+            </a:endParaRPr>
+          </a:p>
+        </p:txBody>
+      </p:sp>
+      <p:sp>
+        <p:nvSpPr>
+          <p:cNvPr id="15" name="pole tekstowe 14">
+            <a:extLst>
+              <a:ext uri="{FF2B5EF4-FFF2-40B4-BE49-F238E27FC236}">
+                <a16:creationId xmlns:a16="http://schemas.microsoft.com/office/drawing/2014/main" id="{FD5CE051-98EA-2699-8A6B-0F9BEF7177B4}"/>
+              </a:ext>
+            </a:extLst>
+          </p:cNvPr>
+          <p:cNvSpPr txBox="1"/>
+          <p:nvPr/>
+        </p:nvSpPr>
+        <p:spPr>
+          <a:xfrm>
+            <a:off x="11106594" y="3449215"/>
+            <a:ext cx="1078963" cy="461665"/>
+          </a:xfrm>
+          <a:prstGeom prst="rect">
+            <a:avLst/>
+          </a:prstGeom>
+          <a:noFill/>
+        </p:spPr>
+        <p:txBody>
+          <a:bodyPr wrap="square" rtlCol="0">
+            <a:spAutoFit/>
+          </a:bodyPr>
+          <a:lstStyle/>
+          <a:p>
+            <a:r>
+              <a:rPr lang="pl-PL" sz="1200" dirty="0"/>
+              <a:t>Przetworzone piksele /32bit</a:t>
+            </a:r>
+          </a:p>
+        </p:txBody>
+      </p:sp>
+      <p:sp>
+        <p:nvSpPr>
+          <p:cNvPr id="16" name="Prostokąt 15">
+            <a:extLst>
+              <a:ext uri="{FF2B5EF4-FFF2-40B4-BE49-F238E27FC236}">
+                <a16:creationId xmlns:a16="http://schemas.microsoft.com/office/drawing/2014/main" id="{C8101858-AC3A-4C2A-F2B4-95689EF0C8DB}"/>
+              </a:ext>
+            </a:extLst>
+          </p:cNvPr>
+          <p:cNvSpPr/>
+          <p:nvPr/>
+        </p:nvSpPr>
+        <p:spPr>
+          <a:xfrm>
+            <a:off x="5754162" y="2294864"/>
+            <a:ext cx="1837775" cy="1266304"/>
+          </a:xfrm>
+          <a:prstGeom prst="rect">
+            <a:avLst/>
+          </a:prstGeom>
+          <a:solidFill>
+            <a:srgbClr val="D44C2C"/>
+          </a:solidFill>
+        </p:spPr>
+        <p:style>
+          <a:lnRef idx="2">
+            <a:schemeClr val="accent4">
+              <a:shade val="50000"/>
+            </a:schemeClr>
+          </a:lnRef>
+          <a:fillRef idx="1">
+            <a:schemeClr val="accent4"/>
+          </a:fillRef>
+          <a:effectRef idx="0">
+            <a:schemeClr val="accent4"/>
+          </a:effectRef>
+          <a:fontRef idx="minor">
+            <a:schemeClr val="lt1"/>
+          </a:fontRef>
+        </p:style>
+        <p:txBody>
+          <a:bodyPr rtlCol="0" anchor="b"/>
+          <a:lstStyle/>
+          <a:p>
+            <a:pPr algn="ctr"/>
+            <a:r>
+              <a:rPr lang="pl-PL" dirty="0" err="1"/>
+              <a:t>Filtering</a:t>
+            </a:r>
+            <a:r>
+              <a:rPr lang="pl-PL" dirty="0"/>
+              <a:t> </a:t>
+            </a:r>
+            <a:r>
+              <a:rPr lang="pl-PL" dirty="0" err="1"/>
+              <a:t>control</a:t>
+            </a:r>
+            <a:r>
+              <a:rPr lang="pl-PL" dirty="0"/>
+              <a:t> unit </a:t>
+            </a:r>
+          </a:p>
+        </p:txBody>
+      </p:sp>
+      <p:sp>
+        <p:nvSpPr>
+          <p:cNvPr id="17" name="Strzałka: w prawo 16">
+            <a:extLst>
+              <a:ext uri="{FF2B5EF4-FFF2-40B4-BE49-F238E27FC236}">
+                <a16:creationId xmlns:a16="http://schemas.microsoft.com/office/drawing/2014/main" id="{F17E0984-C218-BD76-9F08-D0AE7A738CCF}"/>
+              </a:ext>
+            </a:extLst>
+          </p:cNvPr>
+          <p:cNvSpPr/>
+          <p:nvPr/>
+        </p:nvSpPr>
+        <p:spPr>
+          <a:xfrm>
+            <a:off x="4289563" y="2438548"/>
+            <a:ext cx="1434652" cy="150418"/>
+          </a:xfrm>
+          <a:prstGeom prst="rightArrow">
+            <a:avLst/>
+          </a:prstGeom>
+        </p:spPr>
+        <p:style>
+          <a:lnRef idx="2">
+            <a:schemeClr val="accent4">
+              <a:shade val="50000"/>
+            </a:schemeClr>
+          </a:lnRef>
+          <a:fillRef idx="1">
+            <a:schemeClr val="accent4"/>
+          </a:fillRef>
+          <a:effectRef idx="0">
+            <a:schemeClr val="accent4"/>
+          </a:effectRef>
+          <a:fontRef idx="minor">
+            <a:schemeClr val="lt1"/>
+          </a:fontRef>
+        </p:style>
+        <p:txBody>
+          <a:bodyPr rtlCol="0" anchor="ctr"/>
+          <a:lstStyle/>
+          <a:p>
+            <a:pPr algn="ctr"/>
+            <a:endParaRPr lang="pl-PL"/>
+          </a:p>
+        </p:txBody>
+      </p:sp>
+      <p:sp>
+        <p:nvSpPr>
+          <p:cNvPr id="18" name="pole tekstowe 17">
+            <a:extLst>
+              <a:ext uri="{FF2B5EF4-FFF2-40B4-BE49-F238E27FC236}">
+                <a16:creationId xmlns:a16="http://schemas.microsoft.com/office/drawing/2014/main" id="{A37915CB-8614-A0AC-D666-AB8288371247}"/>
+              </a:ext>
+            </a:extLst>
+          </p:cNvPr>
+          <p:cNvSpPr txBox="1"/>
+          <p:nvPr/>
+        </p:nvSpPr>
+        <p:spPr>
+          <a:xfrm>
+            <a:off x="5703412" y="2402564"/>
+            <a:ext cx="622286" cy="261610"/>
+          </a:xfrm>
+          <a:prstGeom prst="rect">
+            <a:avLst/>
+          </a:prstGeom>
+          <a:noFill/>
+        </p:spPr>
+        <p:txBody>
+          <a:bodyPr wrap="none" rtlCol="0">
+            <a:spAutoFit/>
+          </a:bodyPr>
+          <a:lstStyle/>
+          <a:p>
+            <a:r>
+              <a:rPr lang="pl-PL" sz="1100" dirty="0"/>
+              <a:t>AXI-SLV</a:t>
+            </a:r>
+          </a:p>
+        </p:txBody>
+      </p:sp>
+      <p:sp>
+        <p:nvSpPr>
+          <p:cNvPr id="19" name="Prostokąt 18">
+            <a:extLst>
+              <a:ext uri="{FF2B5EF4-FFF2-40B4-BE49-F238E27FC236}">
+                <a16:creationId xmlns:a16="http://schemas.microsoft.com/office/drawing/2014/main" id="{255E9AB4-B91D-EFCE-AD53-B7DF92D3AAA6}"/>
+              </a:ext>
+            </a:extLst>
+          </p:cNvPr>
+          <p:cNvSpPr/>
+          <p:nvPr/>
+        </p:nvSpPr>
+        <p:spPr>
+          <a:xfrm>
+            <a:off x="7876617" y="4034173"/>
+            <a:ext cx="1371491" cy="1266304"/>
+          </a:xfrm>
+          <a:prstGeom prst="rect">
+            <a:avLst/>
+          </a:prstGeom>
+        </p:spPr>
+        <p:style>
+          <a:lnRef idx="2">
+            <a:schemeClr val="accent6">
+              <a:shade val="50000"/>
+            </a:schemeClr>
+          </a:lnRef>
+          <a:fillRef idx="1">
+            <a:schemeClr val="accent6"/>
+          </a:fillRef>
+          <a:effectRef idx="0">
+            <a:schemeClr val="accent6"/>
+          </a:effectRef>
+          <a:fontRef idx="minor">
+            <a:schemeClr val="lt1"/>
+          </a:fontRef>
+        </p:style>
+        <p:txBody>
+          <a:bodyPr rtlCol="0" anchor="ctr"/>
+          <a:lstStyle/>
+          <a:p>
+            <a:pPr algn="ctr"/>
+            <a:r>
+              <a:rPr lang="pl-PL" sz="1200" dirty="0"/>
+              <a:t>BRAM 2 port 3x3 pamięć </a:t>
+            </a:r>
+            <a:r>
+              <a:rPr lang="pl-PL" sz="1200" dirty="0" err="1"/>
+              <a:t>kernela</a:t>
+            </a:r>
+            <a:endParaRPr lang="pl-PL" sz="1200" dirty="0"/>
+          </a:p>
+        </p:txBody>
+      </p:sp>
+      <p:cxnSp>
+        <p:nvCxnSpPr>
+          <p:cNvPr id="21" name="Łącznik prosty ze strzałką 20">
+            <a:extLst>
+              <a:ext uri="{FF2B5EF4-FFF2-40B4-BE49-F238E27FC236}">
+                <a16:creationId xmlns:a16="http://schemas.microsoft.com/office/drawing/2014/main" id="{5F6098F6-FF53-F532-C833-C9F524C7F511}"/>
+              </a:ext>
+            </a:extLst>
+          </p:cNvPr>
+          <p:cNvCxnSpPr>
+            <a:cxnSpLocks/>
+            <a:endCxn id="19" idx="1"/>
+          </p:cNvCxnSpPr>
+          <p:nvPr/>
+        </p:nvCxnSpPr>
+        <p:spPr>
+          <a:xfrm>
+            <a:off x="4204156" y="2919123"/>
+            <a:ext cx="3672461" cy="1748202"/>
+          </a:xfrm>
+          <a:prstGeom prst="bentConnector3">
+            <a:avLst>
+              <a:gd name="adj1" fmla="val 34664"/>
+            </a:avLst>
+          </a:prstGeom>
+          <a:ln w="76200">
+            <a:tailEnd type="triangle"/>
+          </a:ln>
+        </p:spPr>
+        <p:style>
+          <a:lnRef idx="1">
+            <a:schemeClr val="accent4"/>
+          </a:lnRef>
+          <a:fillRef idx="0">
+            <a:schemeClr val="accent4"/>
+          </a:fillRef>
+          <a:effectRef idx="0">
+            <a:schemeClr val="accent4"/>
+          </a:effectRef>
+          <a:fontRef idx="minor">
+            <a:schemeClr val="tx1"/>
+          </a:fontRef>
+        </p:style>
+      </p:cxnSp>
+      <p:sp>
+        <p:nvSpPr>
+          <p:cNvPr id="23" name="Strzałka: w prawo 22">
+            <a:extLst>
+              <a:ext uri="{FF2B5EF4-FFF2-40B4-BE49-F238E27FC236}">
+                <a16:creationId xmlns:a16="http://schemas.microsoft.com/office/drawing/2014/main" id="{4A4B696E-2B27-0BCA-DB4E-F0BC41D9BDC5}"/>
+              </a:ext>
+            </a:extLst>
+          </p:cNvPr>
+          <p:cNvSpPr/>
+          <p:nvPr/>
+        </p:nvSpPr>
+        <p:spPr>
+          <a:xfrm>
+            <a:off x="9271748" y="5619476"/>
+            <a:ext cx="853486" cy="760347"/>
+          </a:xfrm>
+          <a:prstGeom prst="rightArrow">
+            <a:avLst/>
+          </a:prstGeom>
+          <a:solidFill>
+            <a:schemeClr val="accent2">
+              <a:lumMod val="40000"/>
+              <a:lumOff val="60000"/>
+            </a:schemeClr>
+          </a:solidFill>
+        </p:spPr>
+        <p:style>
+          <a:lnRef idx="2">
+            <a:schemeClr val="accent1">
+              <a:shade val="50000"/>
+            </a:schemeClr>
+          </a:lnRef>
+          <a:fillRef idx="1">
+            <a:schemeClr val="accent1"/>
+          </a:fillRef>
+          <a:effectRef idx="0">
+            <a:schemeClr val="accent1"/>
+          </a:effectRef>
+          <a:fontRef idx="minor">
+            <a:schemeClr val="lt1"/>
+          </a:fontRef>
+        </p:style>
+        <p:txBody>
+          <a:bodyPr rtlCol="0" anchor="ctr"/>
+          <a:lstStyle/>
+          <a:p>
+            <a:pPr algn="ctr"/>
+            <a:r>
+              <a:rPr lang="pl-PL" sz="1050" dirty="0">
+                <a:solidFill>
+                  <a:schemeClr val="tx1"/>
+                </a:solidFill>
+              </a:rPr>
+              <a:t>Kolejne 3 piksele /72 bit</a:t>
+            </a:r>
+          </a:p>
+        </p:txBody>
+      </p:sp>
+      <p:sp>
+        <p:nvSpPr>
+          <p:cNvPr id="24" name="Strzałka: w prawo 23">
+            <a:extLst>
+              <a:ext uri="{FF2B5EF4-FFF2-40B4-BE49-F238E27FC236}">
+                <a16:creationId xmlns:a16="http://schemas.microsoft.com/office/drawing/2014/main" id="{5839B357-A329-7869-EE97-5FB748CF77BE}"/>
+              </a:ext>
+            </a:extLst>
+          </p:cNvPr>
+          <p:cNvSpPr/>
+          <p:nvPr/>
+        </p:nvSpPr>
+        <p:spPr>
+          <a:xfrm>
+            <a:off x="9241049" y="4310308"/>
+            <a:ext cx="990998" cy="760347"/>
+          </a:xfrm>
+          <a:prstGeom prst="rightArrow">
+            <a:avLst/>
+          </a:prstGeom>
+          <a:solidFill>
+            <a:schemeClr val="accent2">
+              <a:lumMod val="40000"/>
+              <a:lumOff val="60000"/>
+            </a:schemeClr>
+          </a:solidFill>
+        </p:spPr>
+        <p:style>
+          <a:lnRef idx="2">
+            <a:schemeClr val="accent1">
+              <a:shade val="50000"/>
+            </a:schemeClr>
+          </a:lnRef>
+          <a:fillRef idx="1">
+            <a:schemeClr val="accent1"/>
+          </a:fillRef>
+          <a:effectRef idx="0">
+            <a:schemeClr val="accent1"/>
+          </a:effectRef>
+          <a:fontRef idx="minor">
+            <a:schemeClr val="lt1"/>
+          </a:fontRef>
+        </p:style>
+        <p:txBody>
+          <a:bodyPr rtlCol="0" anchor="ctr"/>
+          <a:lstStyle/>
+          <a:p>
+            <a:pPr algn="ctr"/>
+            <a:r>
+              <a:rPr lang="pl-PL" sz="1050" dirty="0">
+                <a:solidFill>
+                  <a:schemeClr val="tx1"/>
+                </a:solidFill>
+              </a:rPr>
+              <a:t>Kolejne  3 współczynniki /72 bit</a:t>
+            </a:r>
+          </a:p>
+          <a:p>
+            <a:pPr algn="ctr"/>
+            <a:r>
+              <a:rPr lang="pl-PL" sz="1050" dirty="0">
+                <a:solidFill>
+                  <a:schemeClr val="tx1"/>
+                </a:solidFill>
+              </a:rPr>
+              <a:t>3*24 bit</a:t>
+            </a:r>
+          </a:p>
+        </p:txBody>
+      </p:sp>
+      <p:cxnSp>
+        <p:nvCxnSpPr>
+          <p:cNvPr id="26" name="Łącznik prosty ze strzałką 25">
+            <a:extLst>
+              <a:ext uri="{FF2B5EF4-FFF2-40B4-BE49-F238E27FC236}">
+                <a16:creationId xmlns:a16="http://schemas.microsoft.com/office/drawing/2014/main" id="{A995F911-650D-7249-6045-409FCBBCC9A2}"/>
+              </a:ext>
+            </a:extLst>
+          </p:cNvPr>
+          <p:cNvCxnSpPr>
+            <a:cxnSpLocks/>
+            <a:stCxn id="16" idx="2"/>
+          </p:cNvCxnSpPr>
+          <p:nvPr/>
+        </p:nvCxnSpPr>
+        <p:spPr>
+          <a:xfrm rot="5400000">
+            <a:off x="5498894" y="2736724"/>
+            <a:ext cx="349712" cy="1998600"/>
+          </a:xfrm>
+          <a:prstGeom prst="bentConnector2">
+            <a:avLst/>
+          </a:prstGeom>
+          <a:ln w="28575">
+            <a:tailEnd type="triangle"/>
+          </a:ln>
+        </p:spPr>
+        <p:style>
+          <a:lnRef idx="1">
+            <a:schemeClr val="accent1"/>
+          </a:lnRef>
+          <a:fillRef idx="0">
+            <a:schemeClr val="accent1"/>
+          </a:fillRef>
+          <a:effectRef idx="0">
+            <a:schemeClr val="accent1"/>
+          </a:effectRef>
+          <a:fontRef idx="minor">
+            <a:schemeClr val="tx1"/>
+          </a:fontRef>
+        </p:style>
+      </p:cxnSp>
+      <p:sp>
+        <p:nvSpPr>
+          <p:cNvPr id="29" name="pole tekstowe 28">
+            <a:extLst>
+              <a:ext uri="{FF2B5EF4-FFF2-40B4-BE49-F238E27FC236}">
+                <a16:creationId xmlns:a16="http://schemas.microsoft.com/office/drawing/2014/main" id="{56F5BB94-8FBE-C663-7F0D-AFF33A9BAF32}"/>
+              </a:ext>
+            </a:extLst>
+          </p:cNvPr>
+          <p:cNvSpPr txBox="1"/>
+          <p:nvPr/>
+        </p:nvSpPr>
+        <p:spPr>
+          <a:xfrm>
+            <a:off x="5353880" y="3724874"/>
+            <a:ext cx="1159292" cy="400110"/>
+          </a:xfrm>
+          <a:prstGeom prst="rect">
+            <a:avLst/>
+          </a:prstGeom>
+          <a:noFill/>
+        </p:spPr>
+        <p:txBody>
+          <a:bodyPr wrap="none" rtlCol="0">
+            <a:spAutoFit/>
+          </a:bodyPr>
+          <a:lstStyle/>
+          <a:p>
+            <a:r>
+              <a:rPr lang="pl-PL" sz="1000" dirty="0"/>
+              <a:t>Żądanie kolejnego </a:t>
+            </a:r>
+          </a:p>
+          <a:p>
+            <a:r>
+              <a:rPr lang="pl-PL" sz="1000" dirty="0"/>
+              <a:t>wiersza/wierszy</a:t>
+            </a:r>
+          </a:p>
+        </p:txBody>
+      </p:sp>
+      <p:cxnSp>
+        <p:nvCxnSpPr>
+          <p:cNvPr id="32" name="Łącznik prosty ze strzałką 31">
+            <a:extLst>
+              <a:ext uri="{FF2B5EF4-FFF2-40B4-BE49-F238E27FC236}">
+                <a16:creationId xmlns:a16="http://schemas.microsoft.com/office/drawing/2014/main" id="{F5005CC9-C4FC-DADA-F094-51DEB10FDB61}"/>
+              </a:ext>
+            </a:extLst>
+          </p:cNvPr>
+          <p:cNvCxnSpPr>
+            <a:cxnSpLocks/>
+            <a:endCxn id="16" idx="1"/>
+          </p:cNvCxnSpPr>
+          <p:nvPr/>
+        </p:nvCxnSpPr>
+        <p:spPr>
+          <a:xfrm flipV="1">
+            <a:off x="4603242" y="2928016"/>
+            <a:ext cx="1150920" cy="408219"/>
+          </a:xfrm>
+          <a:prstGeom prst="bentConnector3">
+            <a:avLst>
+              <a:gd name="adj1" fmla="val 35031"/>
+            </a:avLst>
+          </a:prstGeom>
+          <a:ln>
+            <a:tailEnd type="triangle"/>
+          </a:ln>
+        </p:spPr>
+        <p:style>
+          <a:lnRef idx="1">
+            <a:schemeClr val="accent1"/>
+          </a:lnRef>
+          <a:fillRef idx="0">
+            <a:schemeClr val="accent1"/>
+          </a:fillRef>
+          <a:effectRef idx="0">
+            <a:schemeClr val="accent1"/>
+          </a:effectRef>
+          <a:fontRef idx="minor">
+            <a:schemeClr val="tx1"/>
+          </a:fontRef>
+        </p:style>
+      </p:cxnSp>
+      <p:sp>
+        <p:nvSpPr>
+          <p:cNvPr id="34" name="pole tekstowe 33">
+            <a:extLst>
+              <a:ext uri="{FF2B5EF4-FFF2-40B4-BE49-F238E27FC236}">
+                <a16:creationId xmlns:a16="http://schemas.microsoft.com/office/drawing/2014/main" id="{1175F354-EA47-49E3-C537-1F6B2E401139}"/>
+              </a:ext>
+            </a:extLst>
+          </p:cNvPr>
+          <p:cNvSpPr txBox="1"/>
+          <p:nvPr/>
+        </p:nvSpPr>
+        <p:spPr>
+          <a:xfrm>
+            <a:off x="4651170" y="3128133"/>
+            <a:ext cx="375424" cy="261610"/>
+          </a:xfrm>
+          <a:prstGeom prst="rect">
+            <a:avLst/>
+          </a:prstGeom>
+          <a:noFill/>
+        </p:spPr>
+        <p:txBody>
+          <a:bodyPr wrap="none" rtlCol="0">
+            <a:spAutoFit/>
+          </a:bodyPr>
+          <a:lstStyle/>
+          <a:p>
+            <a:r>
+              <a:rPr lang="pl-PL" sz="1050" dirty="0" err="1"/>
+              <a:t>ack</a:t>
+            </a:r>
+            <a:endParaRPr lang="pl-PL" sz="1050" dirty="0"/>
+          </a:p>
+        </p:txBody>
+      </p:sp>
+      <p:graphicFrame>
+        <p:nvGraphicFramePr>
+          <p:cNvPr id="35" name="Tabela 11">
+            <a:extLst>
+              <a:ext uri="{FF2B5EF4-FFF2-40B4-BE49-F238E27FC236}">
+                <a16:creationId xmlns:a16="http://schemas.microsoft.com/office/drawing/2014/main" id="{A43131D7-F0C9-02A9-FF14-30D94CFD4EAF}"/>
+              </a:ext>
+            </a:extLst>
+          </p:cNvPr>
+          <p:cNvGraphicFramePr>
+            <a:graphicFrameLocks noGrp="1"/>
+          </p:cNvGraphicFramePr>
+          <p:nvPr>
+            <p:extLst>
+              <p:ext uri="{D42A27DB-BD31-4B8C-83A1-F6EECF244321}">
+                <p14:modId xmlns:p14="http://schemas.microsoft.com/office/powerpoint/2010/main" val="1238754325"/>
+              </p:ext>
+            </p:extLst>
+          </p:nvPr>
+        </p:nvGraphicFramePr>
+        <p:xfrm>
+          <a:off x="6277602" y="2294863"/>
+          <a:ext cx="1056471" cy="731520"/>
+        </p:xfrm>
+        <a:graphic>
+          <a:graphicData uri="http://schemas.openxmlformats.org/drawingml/2006/table">
+            <a:tbl>
+              <a:tblPr firstRow="1" bandRow="1">
+                <a:tableStyleId>{5940675A-B579-460E-94D1-54222C63F5DA}</a:tableStyleId>
+              </a:tblPr>
+              <a:tblGrid>
+                <a:gridCol w="1056471">
+                  <a:extLst>
+                    <a:ext uri="{9D8B030D-6E8A-4147-A177-3AD203B41FA5}">
+                      <a16:colId xmlns:a16="http://schemas.microsoft.com/office/drawing/2014/main" val="2541253828"/>
+                    </a:ext>
+                  </a:extLst>
+                </a:gridCol>
+              </a:tblGrid>
+              <a:tr h="0">
+                <a:tc>
+                  <a:txBody>
+                    <a:bodyPr/>
+                    <a:lstStyle/>
+                    <a:p>
+                      <a:r>
+                        <a:rPr lang="pl-PL" sz="600" dirty="0"/>
+                        <a:t>Start</a:t>
+                      </a:r>
+                    </a:p>
+                  </a:txBody>
+                  <a:tcPr>
+                    <a:solidFill>
+                      <a:schemeClr val="bg2">
+                        <a:lumMod val="90000"/>
+                      </a:schemeClr>
+                    </a:solidFill>
+                  </a:tcPr>
+                </a:tc>
+                <a:extLst>
+                  <a:ext uri="{0D108BD9-81ED-4DB2-BD59-A6C34878D82A}">
+                    <a16:rowId xmlns:a16="http://schemas.microsoft.com/office/drawing/2014/main" val="1035618729"/>
+                  </a:ext>
+                </a:extLst>
+              </a:tr>
+              <a:tr h="0">
+                <a:tc>
+                  <a:txBody>
+                    <a:bodyPr/>
+                    <a:lstStyle/>
+                    <a:p>
+                      <a:r>
+                        <a:rPr lang="pl-PL" sz="600" dirty="0" err="1"/>
+                        <a:t>Done</a:t>
+                      </a:r>
+                      <a:endParaRPr lang="pl-PL" sz="600" dirty="0"/>
+                    </a:p>
+                  </a:txBody>
+                  <a:tcPr>
+                    <a:solidFill>
+                      <a:schemeClr val="bg2">
+                        <a:lumMod val="90000"/>
+                      </a:schemeClr>
+                    </a:solidFill>
+                  </a:tcPr>
+                </a:tc>
+                <a:extLst>
+                  <a:ext uri="{0D108BD9-81ED-4DB2-BD59-A6C34878D82A}">
+                    <a16:rowId xmlns:a16="http://schemas.microsoft.com/office/drawing/2014/main" val="2967992603"/>
+                  </a:ext>
+                </a:extLst>
+              </a:tr>
+              <a:tr h="175977">
+                <a:tc>
+                  <a:txBody>
+                    <a:bodyPr/>
+                    <a:lstStyle/>
+                    <a:p>
+                      <a:r>
+                        <a:rPr lang="pl-PL" sz="600" dirty="0" err="1"/>
+                        <a:t>Width</a:t>
+                      </a:r>
+                      <a:r>
+                        <a:rPr lang="pl-PL" sz="600" dirty="0"/>
+                        <a:t>  </a:t>
+                      </a:r>
+                      <a:r>
+                        <a:rPr lang="pl-PL" sz="600" dirty="0" err="1"/>
+                        <a:t>without</a:t>
+                      </a:r>
+                      <a:r>
+                        <a:rPr lang="pl-PL" sz="600" dirty="0"/>
+                        <a:t>  </a:t>
+                      </a:r>
+                      <a:r>
+                        <a:rPr lang="pl-PL" sz="600" dirty="0" err="1"/>
+                        <a:t>padding</a:t>
+                      </a:r>
+                      <a:endParaRPr lang="pl-PL" sz="600" dirty="0"/>
+                    </a:p>
+                  </a:txBody>
+                  <a:tcPr>
+                    <a:solidFill>
+                      <a:schemeClr val="bg2">
+                        <a:lumMod val="90000"/>
+                      </a:schemeClr>
+                    </a:solidFill>
+                  </a:tcPr>
+                </a:tc>
+                <a:extLst>
+                  <a:ext uri="{0D108BD9-81ED-4DB2-BD59-A6C34878D82A}">
+                    <a16:rowId xmlns:a16="http://schemas.microsoft.com/office/drawing/2014/main" val="260174869"/>
+                  </a:ext>
+                </a:extLst>
+              </a:tr>
+              <a:tr h="175977">
+                <a:tc>
+                  <a:txBody>
+                    <a:bodyPr/>
+                    <a:lstStyle/>
+                    <a:p>
+                      <a:r>
+                        <a:rPr lang="pl-PL" sz="600" dirty="0" err="1"/>
+                        <a:t>Height</a:t>
+                      </a:r>
+                      <a:r>
+                        <a:rPr lang="pl-PL" sz="600" dirty="0"/>
+                        <a:t> (</a:t>
+                      </a:r>
+                      <a:r>
+                        <a:rPr lang="pl-PL" sz="600" dirty="0" err="1"/>
+                        <a:t>without</a:t>
+                      </a:r>
+                      <a:r>
+                        <a:rPr lang="pl-PL" sz="600" dirty="0"/>
+                        <a:t> </a:t>
+                      </a:r>
+                      <a:r>
+                        <a:rPr lang="pl-PL" sz="600" dirty="0" err="1"/>
+                        <a:t>padding</a:t>
+                      </a:r>
+                      <a:r>
+                        <a:rPr lang="pl-PL" sz="600" dirty="0"/>
+                        <a:t>)</a:t>
+                      </a:r>
+                    </a:p>
+                  </a:txBody>
+                  <a:tcPr>
+                    <a:solidFill>
+                      <a:schemeClr val="bg2">
+                        <a:lumMod val="90000"/>
+                      </a:schemeClr>
+                    </a:solidFill>
+                  </a:tcPr>
+                </a:tc>
+                <a:extLst>
+                  <a:ext uri="{0D108BD9-81ED-4DB2-BD59-A6C34878D82A}">
+                    <a16:rowId xmlns:a16="http://schemas.microsoft.com/office/drawing/2014/main" val="2731059978"/>
+                  </a:ext>
+                </a:extLst>
+              </a:tr>
+            </a:tbl>
+          </a:graphicData>
+        </a:graphic>
+      </p:graphicFrame>
+      <p:sp>
+        <p:nvSpPr>
+          <p:cNvPr id="39" name="pole tekstowe 38">
+            <a:extLst>
+              <a:ext uri="{FF2B5EF4-FFF2-40B4-BE49-F238E27FC236}">
+                <a16:creationId xmlns:a16="http://schemas.microsoft.com/office/drawing/2014/main" id="{D1496912-1FA4-53C7-2029-9D406F0825E7}"/>
+              </a:ext>
+            </a:extLst>
+          </p:cNvPr>
+          <p:cNvSpPr txBox="1"/>
+          <p:nvPr/>
+        </p:nvSpPr>
+        <p:spPr>
+          <a:xfrm>
+            <a:off x="5620455" y="4424359"/>
+            <a:ext cx="1731564" cy="253916"/>
+          </a:xfrm>
+          <a:prstGeom prst="rect">
+            <a:avLst/>
+          </a:prstGeom>
+          <a:noFill/>
+        </p:spPr>
+        <p:txBody>
+          <a:bodyPr wrap="none" rtlCol="0">
+            <a:spAutoFit/>
+          </a:bodyPr>
+          <a:lstStyle/>
+          <a:p>
+            <a:r>
+              <a:rPr lang="pl-PL" sz="1050" dirty="0"/>
+              <a:t>Nowe współczynniki </a:t>
+            </a:r>
+            <a:r>
+              <a:rPr lang="pl-PL" sz="1050" dirty="0" err="1"/>
+              <a:t>kernela</a:t>
+            </a:r>
+            <a:endParaRPr lang="pl-PL" sz="1050" dirty="0"/>
+          </a:p>
+        </p:txBody>
+      </p:sp>
+      <p:sp>
+        <p:nvSpPr>
+          <p:cNvPr id="49" name="Prostokąt 48">
+            <a:extLst>
+              <a:ext uri="{FF2B5EF4-FFF2-40B4-BE49-F238E27FC236}">
+                <a16:creationId xmlns:a16="http://schemas.microsoft.com/office/drawing/2014/main" id="{E31C1A7C-B8F4-3531-3C42-4ACC81741DB9}"/>
+              </a:ext>
+            </a:extLst>
+          </p:cNvPr>
+          <p:cNvSpPr/>
+          <p:nvPr/>
+        </p:nvSpPr>
+        <p:spPr>
+          <a:xfrm>
+            <a:off x="10221705" y="4498983"/>
+            <a:ext cx="1575638" cy="2088443"/>
+          </a:xfrm>
+          <a:prstGeom prst="rect">
+            <a:avLst/>
+          </a:prstGeom>
+          <a:solidFill>
+            <a:srgbClr val="A852B6"/>
+          </a:solidFill>
+        </p:spPr>
+        <p:style>
+          <a:lnRef idx="2">
+            <a:schemeClr val="accent1">
+              <a:shade val="50000"/>
+            </a:schemeClr>
+          </a:lnRef>
+          <a:fillRef idx="1">
+            <a:schemeClr val="accent1"/>
+          </a:fillRef>
+          <a:effectRef idx="0">
+            <a:schemeClr val="accent1"/>
+          </a:effectRef>
+          <a:fontRef idx="minor">
+            <a:schemeClr val="lt1"/>
+          </a:fontRef>
+        </p:style>
+        <p:txBody>
+          <a:bodyPr rtlCol="0" anchor="ctr"/>
+          <a:lstStyle/>
+          <a:p>
+            <a:pPr algn="ctr"/>
+            <a:r>
+              <a:rPr lang="pl-PL" dirty="0" err="1"/>
+              <a:t>MAC_wrapper</a:t>
+            </a:r>
+            <a:endParaRPr lang="pl-PL" dirty="0"/>
+          </a:p>
+        </p:txBody>
+      </p:sp>
+      <p:cxnSp>
+        <p:nvCxnSpPr>
+          <p:cNvPr id="53" name="Łącznik prosty ze strzałką 52">
+            <a:extLst>
+              <a:ext uri="{FF2B5EF4-FFF2-40B4-BE49-F238E27FC236}">
+                <a16:creationId xmlns:a16="http://schemas.microsoft.com/office/drawing/2014/main" id="{23C3BA24-5634-1D9E-E28D-EC4B11DF4F27}"/>
+              </a:ext>
+            </a:extLst>
+          </p:cNvPr>
+          <p:cNvCxnSpPr/>
+          <p:nvPr/>
+        </p:nvCxnSpPr>
+        <p:spPr>
+          <a:xfrm rot="16200000" flipH="1">
+            <a:off x="6353915" y="4244841"/>
+            <a:ext cx="1845282" cy="545565"/>
+          </a:xfrm>
+          <a:prstGeom prst="bentConnector3">
+            <a:avLst>
+              <a:gd name="adj1" fmla="val 41741"/>
+            </a:avLst>
+          </a:prstGeom>
+          <a:ln w="38100">
+            <a:tailEnd type="triangle"/>
+          </a:ln>
+        </p:spPr>
+        <p:style>
+          <a:lnRef idx="1">
+            <a:schemeClr val="accent1"/>
+          </a:lnRef>
+          <a:fillRef idx="0">
+            <a:schemeClr val="accent1"/>
+          </a:fillRef>
+          <a:effectRef idx="0">
+            <a:schemeClr val="accent1"/>
+          </a:effectRef>
+          <a:fontRef idx="minor">
+            <a:schemeClr val="tx1"/>
+          </a:fontRef>
+        </p:style>
+      </p:cxnSp>
+      <p:sp>
+        <p:nvSpPr>
+          <p:cNvPr id="55" name="pole tekstowe 54">
+            <a:extLst>
+              <a:ext uri="{FF2B5EF4-FFF2-40B4-BE49-F238E27FC236}">
+                <a16:creationId xmlns:a16="http://schemas.microsoft.com/office/drawing/2014/main" id="{6D5FCFDE-7003-9000-9B81-22C7D3AE0DFA}"/>
+              </a:ext>
+            </a:extLst>
+          </p:cNvPr>
+          <p:cNvSpPr txBox="1"/>
+          <p:nvPr/>
+        </p:nvSpPr>
+        <p:spPr>
+          <a:xfrm>
+            <a:off x="6953694" y="4136172"/>
+            <a:ext cx="1191289" cy="276999"/>
+          </a:xfrm>
+          <a:prstGeom prst="rect">
+            <a:avLst/>
+          </a:prstGeom>
+          <a:noFill/>
+        </p:spPr>
+        <p:txBody>
+          <a:bodyPr wrap="square" rtlCol="0">
+            <a:spAutoFit/>
+          </a:bodyPr>
+          <a:lstStyle/>
+          <a:p>
+            <a:r>
+              <a:rPr lang="pl-PL" sz="1200" dirty="0"/>
+              <a:t>Kontrola</a:t>
+            </a:r>
+            <a:endParaRPr lang="pl-PL" dirty="0"/>
+          </a:p>
+        </p:txBody>
+      </p:sp>
+      <p:sp>
+        <p:nvSpPr>
+          <p:cNvPr id="65" name="Strzałka: w prawo 64">
+            <a:extLst>
+              <a:ext uri="{FF2B5EF4-FFF2-40B4-BE49-F238E27FC236}">
+                <a16:creationId xmlns:a16="http://schemas.microsoft.com/office/drawing/2014/main" id="{F5B04A1F-4438-3D1E-C562-7E8967775B80}"/>
+              </a:ext>
+            </a:extLst>
+          </p:cNvPr>
+          <p:cNvSpPr/>
+          <p:nvPr/>
+        </p:nvSpPr>
+        <p:spPr>
+          <a:xfrm rot="16200000">
+            <a:off x="10693975" y="4239698"/>
+            <a:ext cx="318608" cy="312490"/>
+          </a:xfrm>
+          <a:prstGeom prst="rightArrow">
+            <a:avLst/>
+          </a:prstGeom>
+          <a:solidFill>
+            <a:schemeClr val="accent2">
+              <a:lumMod val="40000"/>
+              <a:lumOff val="60000"/>
+            </a:schemeClr>
+          </a:solidFill>
+        </p:spPr>
+        <p:style>
+          <a:lnRef idx="2">
+            <a:schemeClr val="accent1">
+              <a:shade val="50000"/>
+            </a:schemeClr>
+          </a:lnRef>
+          <a:fillRef idx="1">
+            <a:schemeClr val="accent1"/>
+          </a:fillRef>
+          <a:effectRef idx="0">
+            <a:schemeClr val="accent1"/>
+          </a:effectRef>
+          <a:fontRef idx="minor">
+            <a:schemeClr val="lt1"/>
+          </a:fontRef>
+        </p:style>
+        <p:txBody>
+          <a:bodyPr rtlCol="0" anchor="ctr"/>
+          <a:lstStyle/>
+          <a:p>
+            <a:pPr algn="ctr"/>
+            <a:endParaRPr lang="pl-PL" sz="1100" dirty="0">
+              <a:solidFill>
+                <a:schemeClr val="tx1"/>
+              </a:solidFill>
+            </a:endParaRPr>
+          </a:p>
+        </p:txBody>
+      </p:sp>
+      <p:cxnSp>
+        <p:nvCxnSpPr>
+          <p:cNvPr id="71" name="Łącznik prosty ze strzałką 70">
+            <a:extLst>
+              <a:ext uri="{FF2B5EF4-FFF2-40B4-BE49-F238E27FC236}">
+                <a16:creationId xmlns:a16="http://schemas.microsoft.com/office/drawing/2014/main" id="{AD9463FB-AD42-9EDA-3D3F-2B002E05F352}"/>
+              </a:ext>
+            </a:extLst>
+          </p:cNvPr>
+          <p:cNvCxnSpPr/>
+          <p:nvPr/>
+        </p:nvCxnSpPr>
+        <p:spPr>
+          <a:xfrm flipV="1">
+            <a:off x="11155845" y="4236639"/>
+            <a:ext cx="0" cy="262344"/>
+          </a:xfrm>
+          <a:prstGeom prst="straightConnector1">
+            <a:avLst/>
+          </a:prstGeom>
+          <a:ln>
+            <a:tailEnd type="triangle"/>
+          </a:ln>
+        </p:spPr>
+        <p:style>
+          <a:lnRef idx="1">
+            <a:schemeClr val="accent1"/>
+          </a:lnRef>
+          <a:fillRef idx="0">
+            <a:schemeClr val="accent1"/>
+          </a:fillRef>
+          <a:effectRef idx="0">
+            <a:schemeClr val="accent1"/>
+          </a:effectRef>
+          <a:fontRef idx="minor">
+            <a:schemeClr val="tx1"/>
+          </a:fontRef>
+        </p:style>
+      </p:cxnSp>
+      <p:sp>
+        <p:nvSpPr>
+          <p:cNvPr id="72" name="pole tekstowe 71">
+            <a:extLst>
+              <a:ext uri="{FF2B5EF4-FFF2-40B4-BE49-F238E27FC236}">
+                <a16:creationId xmlns:a16="http://schemas.microsoft.com/office/drawing/2014/main" id="{54EB5094-919F-FA21-BD9F-9FC7ECF43B9D}"/>
+              </a:ext>
+            </a:extLst>
+          </p:cNvPr>
+          <p:cNvSpPr txBox="1"/>
+          <p:nvPr/>
+        </p:nvSpPr>
+        <p:spPr>
+          <a:xfrm>
+            <a:off x="11106594" y="4206375"/>
+            <a:ext cx="990998" cy="307777"/>
+          </a:xfrm>
+          <a:prstGeom prst="rect">
+            <a:avLst/>
+          </a:prstGeom>
+          <a:noFill/>
+        </p:spPr>
+        <p:txBody>
+          <a:bodyPr wrap="square" rtlCol="0">
+            <a:spAutoFit/>
+          </a:bodyPr>
+          <a:lstStyle/>
+          <a:p>
+            <a:r>
+              <a:rPr lang="pl-PL" sz="1400" dirty="0" err="1"/>
+              <a:t>vld_out</a:t>
+            </a:r>
+            <a:endParaRPr lang="pl-PL" sz="1400" dirty="0"/>
+          </a:p>
+        </p:txBody>
+      </p:sp>
+      <p:cxnSp>
+        <p:nvCxnSpPr>
+          <p:cNvPr id="73" name="Łącznik prosty ze strzałką 52">
+            <a:extLst>
+              <a:ext uri="{FF2B5EF4-FFF2-40B4-BE49-F238E27FC236}">
+                <a16:creationId xmlns:a16="http://schemas.microsoft.com/office/drawing/2014/main" id="{668AD5FE-8E48-1562-69E1-9FCFACD1C2DC}"/>
+              </a:ext>
+            </a:extLst>
+          </p:cNvPr>
+          <p:cNvCxnSpPr>
+            <a:cxnSpLocks/>
+          </p:cNvCxnSpPr>
+          <p:nvPr/>
+        </p:nvCxnSpPr>
+        <p:spPr>
+          <a:xfrm rot="16200000" flipH="1">
+            <a:off x="7511904" y="3475434"/>
+            <a:ext cx="627326" cy="626519"/>
+          </a:xfrm>
+          <a:prstGeom prst="bentConnector3">
+            <a:avLst>
+              <a:gd name="adj1" fmla="val 50000"/>
+            </a:avLst>
+          </a:prstGeom>
+          <a:ln w="38100">
+            <a:tailEnd type="triangle"/>
+          </a:ln>
+        </p:spPr>
+        <p:style>
+          <a:lnRef idx="1">
+            <a:schemeClr val="accent1"/>
+          </a:lnRef>
+          <a:fillRef idx="0">
+            <a:schemeClr val="accent1"/>
+          </a:fillRef>
+          <a:effectRef idx="0">
+            <a:schemeClr val="accent1"/>
+          </a:effectRef>
+          <a:fontRef idx="minor">
+            <a:schemeClr val="tx1"/>
+          </a:fontRef>
+        </p:style>
+      </p:cxnSp>
+      <p:sp>
+        <p:nvSpPr>
+          <p:cNvPr id="86" name="pole tekstowe 85">
+            <a:extLst>
+              <a:ext uri="{FF2B5EF4-FFF2-40B4-BE49-F238E27FC236}">
+                <a16:creationId xmlns:a16="http://schemas.microsoft.com/office/drawing/2014/main" id="{0B27E385-A67F-33FE-078D-D91544811E2B}"/>
+              </a:ext>
+            </a:extLst>
+          </p:cNvPr>
+          <p:cNvSpPr txBox="1"/>
+          <p:nvPr/>
+        </p:nvSpPr>
+        <p:spPr>
+          <a:xfrm>
+            <a:off x="7469452" y="3557440"/>
+            <a:ext cx="6109252" cy="261610"/>
+          </a:xfrm>
+          <a:prstGeom prst="rect">
+            <a:avLst/>
+          </a:prstGeom>
+          <a:noFill/>
+        </p:spPr>
+        <p:txBody>
+          <a:bodyPr wrap="square">
+            <a:spAutoFit/>
+          </a:bodyPr>
+          <a:lstStyle/>
+          <a:p>
+            <a:r>
+              <a:rPr lang="pl-PL" sz="1100" dirty="0"/>
+              <a:t>Wybór wiersza</a:t>
+            </a:r>
+          </a:p>
+        </p:txBody>
+      </p:sp>
+      <p:cxnSp>
+        <p:nvCxnSpPr>
+          <p:cNvPr id="97" name="Łącznik prosty ze strzałką 96">
+            <a:extLst>
+              <a:ext uri="{FF2B5EF4-FFF2-40B4-BE49-F238E27FC236}">
+                <a16:creationId xmlns:a16="http://schemas.microsoft.com/office/drawing/2014/main" id="{EF64250C-78E3-7F58-FF62-34CF586726AD}"/>
+              </a:ext>
+            </a:extLst>
+          </p:cNvPr>
+          <p:cNvCxnSpPr>
+            <a:stCxn id="16" idx="3"/>
+          </p:cNvCxnSpPr>
+          <p:nvPr/>
+        </p:nvCxnSpPr>
+        <p:spPr>
+          <a:xfrm>
+            <a:off x="7591937" y="2928016"/>
+            <a:ext cx="2817646" cy="1586136"/>
+          </a:xfrm>
+          <a:prstGeom prst="bentConnector3">
+            <a:avLst>
+              <a:gd name="adj1" fmla="val 100325"/>
+            </a:avLst>
+          </a:prstGeom>
+          <a:ln w="38100">
+            <a:tailEnd type="triangle"/>
+          </a:ln>
+        </p:spPr>
+        <p:style>
+          <a:lnRef idx="1">
+            <a:schemeClr val="accent1"/>
+          </a:lnRef>
+          <a:fillRef idx="0">
+            <a:schemeClr val="accent1"/>
+          </a:fillRef>
+          <a:effectRef idx="0">
+            <a:schemeClr val="accent1"/>
+          </a:effectRef>
+          <a:fontRef idx="minor">
+            <a:schemeClr val="tx1"/>
+          </a:fontRef>
+        </p:style>
+      </p:cxnSp>
+      <p:sp>
+        <p:nvSpPr>
+          <p:cNvPr id="100" name="pole tekstowe 99">
+            <a:extLst>
+              <a:ext uri="{FF2B5EF4-FFF2-40B4-BE49-F238E27FC236}">
+                <a16:creationId xmlns:a16="http://schemas.microsoft.com/office/drawing/2014/main" id="{485A3557-7B5E-D8C5-6FDF-DE2148D5CE4B}"/>
+              </a:ext>
+            </a:extLst>
+          </p:cNvPr>
+          <p:cNvSpPr txBox="1"/>
+          <p:nvPr/>
+        </p:nvSpPr>
+        <p:spPr>
+          <a:xfrm>
+            <a:off x="7932958" y="2677303"/>
+            <a:ext cx="1247457" cy="430887"/>
+          </a:xfrm>
+          <a:prstGeom prst="rect">
+            <a:avLst/>
+          </a:prstGeom>
+          <a:noFill/>
+        </p:spPr>
+        <p:txBody>
+          <a:bodyPr wrap="none" rtlCol="0">
+            <a:spAutoFit/>
+          </a:bodyPr>
+          <a:lstStyle/>
+          <a:p>
+            <a:r>
+              <a:rPr lang="pl-PL" sz="1100" dirty="0"/>
+              <a:t>Sygnały kontrolne:</a:t>
+            </a:r>
+          </a:p>
+          <a:p>
+            <a:r>
+              <a:rPr lang="pl-PL" sz="1100" dirty="0"/>
+              <a:t>en, </a:t>
+            </a:r>
+            <a:r>
+              <a:rPr lang="pl-PL" sz="1100" dirty="0" err="1"/>
+              <a:t>new_pix</a:t>
+            </a:r>
+            <a:endParaRPr lang="pl-PL" sz="1100" dirty="0"/>
+          </a:p>
+        </p:txBody>
+      </p:sp>
+      <p:cxnSp>
+        <p:nvCxnSpPr>
+          <p:cNvPr id="102" name="Łącznik prosty ze strzałką 101">
+            <a:extLst>
+              <a:ext uri="{FF2B5EF4-FFF2-40B4-BE49-F238E27FC236}">
+                <a16:creationId xmlns:a16="http://schemas.microsoft.com/office/drawing/2014/main" id="{CCDBD2C9-A9D3-5294-4ECE-D48320C54A2A}"/>
+              </a:ext>
+            </a:extLst>
+          </p:cNvPr>
+          <p:cNvCxnSpPr>
+            <a:cxnSpLocks/>
+          </p:cNvCxnSpPr>
+          <p:nvPr/>
+        </p:nvCxnSpPr>
+        <p:spPr>
+          <a:xfrm rot="5400000">
+            <a:off x="5932777" y="4361396"/>
+            <a:ext cx="1613489" cy="132937"/>
+          </a:xfrm>
+          <a:prstGeom prst="bentConnector3">
+            <a:avLst>
+              <a:gd name="adj1" fmla="val 50000"/>
+            </a:avLst>
+          </a:prstGeom>
+          <a:ln>
+            <a:tailEnd type="triangle"/>
+          </a:ln>
+        </p:spPr>
+        <p:style>
+          <a:lnRef idx="1">
+            <a:schemeClr val="accent1"/>
+          </a:lnRef>
+          <a:fillRef idx="0">
+            <a:schemeClr val="accent1"/>
+          </a:fillRef>
+          <a:effectRef idx="0">
+            <a:schemeClr val="accent1"/>
+          </a:effectRef>
+          <a:fontRef idx="minor">
+            <a:schemeClr val="tx1"/>
+          </a:fontRef>
+        </p:style>
+      </p:cxnSp>
+      <p:sp>
+        <p:nvSpPr>
+          <p:cNvPr id="107" name="pole tekstowe 106">
+            <a:extLst>
+              <a:ext uri="{FF2B5EF4-FFF2-40B4-BE49-F238E27FC236}">
+                <a16:creationId xmlns:a16="http://schemas.microsoft.com/office/drawing/2014/main" id="{8856783B-DFBD-8952-74CA-171704869081}"/>
+              </a:ext>
+            </a:extLst>
+          </p:cNvPr>
+          <p:cNvSpPr txBox="1"/>
+          <p:nvPr/>
+        </p:nvSpPr>
+        <p:spPr>
+          <a:xfrm>
+            <a:off x="6495617" y="4185675"/>
+            <a:ext cx="6801678" cy="215444"/>
+          </a:xfrm>
+          <a:prstGeom prst="rect">
+            <a:avLst/>
+          </a:prstGeom>
+          <a:noFill/>
+        </p:spPr>
+        <p:txBody>
+          <a:bodyPr wrap="square">
+            <a:spAutoFit/>
+          </a:bodyPr>
+          <a:lstStyle/>
+          <a:p>
+            <a:r>
+              <a:rPr lang="pl-PL" sz="800" dirty="0"/>
+              <a:t>Kontrola</a:t>
+            </a:r>
+          </a:p>
+        </p:txBody>
+      </p:sp>
     </p:spTree>
     <p:extLst>
       <p:ext uri="{BB962C8B-B14F-4D97-AF65-F5344CB8AC3E}">

</xml_diff>

<commit_message>
finished project, ready for presentation
</commit_message>
<xml_diff>
--- a/Prezentacja_splotowa_filtracja_obrazu.pptx
+++ b/Prezentacja_splotowa_filtracja_obrazu.pptx
@@ -5,7 +5,7 @@
     <p:sldMasterId id="2147483648" r:id="rId1"/>
   </p:sldMasterIdLst>
   <p:notesMasterIdLst>
-    <p:notesMasterId r:id="rId29"/>
+    <p:notesMasterId r:id="rId31"/>
   </p:notesMasterIdLst>
   <p:sldIdLst>
     <p:sldId id="256" r:id="rId2"/>
@@ -35,6 +35,8 @@
     <p:sldId id="280" r:id="rId26"/>
     <p:sldId id="281" r:id="rId27"/>
     <p:sldId id="283" r:id="rId28"/>
+    <p:sldId id="284" r:id="rId29"/>
+    <p:sldId id="285" r:id="rId30"/>
   </p:sldIdLst>
   <p:sldSz cx="12192000" cy="6858000"/>
   <p:notesSz cx="6858000" cy="9144000"/>
@@ -165,6 +167,8 @@
             <p14:sldId id="280"/>
             <p14:sldId id="281"/>
             <p14:sldId id="283"/>
+            <p14:sldId id="284"/>
+            <p14:sldId id="285"/>
           </p14:sldIdLst>
         </p14:section>
       </p14:sectionLst>
@@ -258,7 +262,7 @@
           <a:p>
             <a:fld id="{53BFE8A1-00DC-4AA4-BB70-09A86B00B079}" type="datetimeFigureOut">
               <a:rPr lang="pl-PL" smtClean="0"/>
-              <a:t>14.06.2023</a:t>
+              <a:t>18.06.2023</a:t>
             </a:fld>
             <a:endParaRPr lang="pl-PL"/>
           </a:p>
@@ -672,7 +676,7 @@
           <a:p>
             <a:fld id="{0F5BA0DB-EAFB-491B-B414-7F15544FAA91}" type="datetimeFigureOut">
               <a:rPr lang="pl-PL" smtClean="0"/>
-              <a:t>14.06.2023</a:t>
+              <a:t>18.06.2023</a:t>
             </a:fld>
             <a:endParaRPr lang="pl-PL"/>
           </a:p>
@@ -870,7 +874,7 @@
           <a:p>
             <a:fld id="{0F5BA0DB-EAFB-491B-B414-7F15544FAA91}" type="datetimeFigureOut">
               <a:rPr lang="pl-PL" smtClean="0"/>
-              <a:t>14.06.2023</a:t>
+              <a:t>18.06.2023</a:t>
             </a:fld>
             <a:endParaRPr lang="pl-PL"/>
           </a:p>
@@ -1078,7 +1082,7 @@
           <a:p>
             <a:fld id="{0F5BA0DB-EAFB-491B-B414-7F15544FAA91}" type="datetimeFigureOut">
               <a:rPr lang="pl-PL" smtClean="0"/>
-              <a:t>14.06.2023</a:t>
+              <a:t>18.06.2023</a:t>
             </a:fld>
             <a:endParaRPr lang="pl-PL"/>
           </a:p>
@@ -1276,7 +1280,7 @@
           <a:p>
             <a:fld id="{0F5BA0DB-EAFB-491B-B414-7F15544FAA91}" type="datetimeFigureOut">
               <a:rPr lang="pl-PL" smtClean="0"/>
-              <a:t>14.06.2023</a:t>
+              <a:t>18.06.2023</a:t>
             </a:fld>
             <a:endParaRPr lang="pl-PL"/>
           </a:p>
@@ -1551,7 +1555,7 @@
           <a:p>
             <a:fld id="{0F5BA0DB-EAFB-491B-B414-7F15544FAA91}" type="datetimeFigureOut">
               <a:rPr lang="pl-PL" smtClean="0"/>
-              <a:t>14.06.2023</a:t>
+              <a:t>18.06.2023</a:t>
             </a:fld>
             <a:endParaRPr lang="pl-PL"/>
           </a:p>
@@ -1816,7 +1820,7 @@
           <a:p>
             <a:fld id="{0F5BA0DB-EAFB-491B-B414-7F15544FAA91}" type="datetimeFigureOut">
               <a:rPr lang="pl-PL" smtClean="0"/>
-              <a:t>14.06.2023</a:t>
+              <a:t>18.06.2023</a:t>
             </a:fld>
             <a:endParaRPr lang="pl-PL"/>
           </a:p>
@@ -2228,7 +2232,7 @@
           <a:p>
             <a:fld id="{0F5BA0DB-EAFB-491B-B414-7F15544FAA91}" type="datetimeFigureOut">
               <a:rPr lang="pl-PL" smtClean="0"/>
-              <a:t>14.06.2023</a:t>
+              <a:t>18.06.2023</a:t>
             </a:fld>
             <a:endParaRPr lang="pl-PL"/>
           </a:p>
@@ -2369,7 +2373,7 @@
           <a:p>
             <a:fld id="{0F5BA0DB-EAFB-491B-B414-7F15544FAA91}" type="datetimeFigureOut">
               <a:rPr lang="pl-PL" smtClean="0"/>
-              <a:t>14.06.2023</a:t>
+              <a:t>18.06.2023</a:t>
             </a:fld>
             <a:endParaRPr lang="pl-PL"/>
           </a:p>
@@ -2482,7 +2486,7 @@
           <a:p>
             <a:fld id="{0F5BA0DB-EAFB-491B-B414-7F15544FAA91}" type="datetimeFigureOut">
               <a:rPr lang="pl-PL" smtClean="0"/>
-              <a:t>14.06.2023</a:t>
+              <a:t>18.06.2023</a:t>
             </a:fld>
             <a:endParaRPr lang="pl-PL"/>
           </a:p>
@@ -2793,7 +2797,7 @@
           <a:p>
             <a:fld id="{0F5BA0DB-EAFB-491B-B414-7F15544FAA91}" type="datetimeFigureOut">
               <a:rPr lang="pl-PL" smtClean="0"/>
-              <a:t>14.06.2023</a:t>
+              <a:t>18.06.2023</a:t>
             </a:fld>
             <a:endParaRPr lang="pl-PL"/>
           </a:p>
@@ -3081,7 +3085,7 @@
           <a:p>
             <a:fld id="{0F5BA0DB-EAFB-491B-B414-7F15544FAA91}" type="datetimeFigureOut">
               <a:rPr lang="pl-PL" smtClean="0"/>
-              <a:t>14.06.2023</a:t>
+              <a:t>18.06.2023</a:t>
             </a:fld>
             <a:endParaRPr lang="pl-PL"/>
           </a:p>
@@ -3322,7 +3326,7 @@
           <a:p>
             <a:fld id="{0F5BA0DB-EAFB-491B-B414-7F15544FAA91}" type="datetimeFigureOut">
               <a:rPr lang="pl-PL" smtClean="0"/>
-              <a:t>14.06.2023</a:t>
+              <a:t>18.06.2023</a:t>
             </a:fld>
             <a:endParaRPr lang="pl-PL"/>
           </a:p>
@@ -27905,6 +27909,181 @@
 </p:sld>
 </file>
 
+<file path=ppt/slides/slide28.xml><?xml version="1.0" encoding="utf-8"?>
+<p:sld xmlns:a="http://schemas.openxmlformats.org/drawingml/2006/main" xmlns:r="http://schemas.openxmlformats.org/officeDocument/2006/relationships" xmlns:p="http://schemas.openxmlformats.org/presentationml/2006/main">
+  <p:cSld>
+    <p:spTree>
+      <p:nvGrpSpPr>
+        <p:cNvPr id="1" name=""/>
+        <p:cNvGrpSpPr/>
+        <p:nvPr/>
+      </p:nvGrpSpPr>
+      <p:grpSpPr>
+        <a:xfrm>
+          <a:off x="0" y="0"/>
+          <a:ext cx="0" cy="0"/>
+          <a:chOff x="0" y="0"/>
+          <a:chExt cx="0" cy="0"/>
+        </a:xfrm>
+      </p:grpSpPr>
+      <p:sp>
+        <p:nvSpPr>
+          <p:cNvPr id="2" name="Tytuł 1">
+            <a:extLst>
+              <a:ext uri="{FF2B5EF4-FFF2-40B4-BE49-F238E27FC236}">
+                <a16:creationId xmlns:a16="http://schemas.microsoft.com/office/drawing/2014/main" id="{55B57416-FE34-4CC3-75C1-A961882CCF29}"/>
+              </a:ext>
+            </a:extLst>
+          </p:cNvPr>
+          <p:cNvSpPr>
+            <a:spLocks noGrp="1"/>
+          </p:cNvSpPr>
+          <p:nvPr>
+            <p:ph type="title"/>
+          </p:nvPr>
+        </p:nvSpPr>
+        <p:spPr/>
+        <p:txBody>
+          <a:bodyPr/>
+          <a:lstStyle/>
+          <a:p>
+            <a:r>
+              <a:rPr lang="pl-PL" dirty="0"/>
+              <a:t>Aplikacja GUI do obsługi filtracji</a:t>
+            </a:r>
+          </a:p>
+        </p:txBody>
+      </p:sp>
+      <p:pic>
+        <p:nvPicPr>
+          <p:cNvPr id="5" name="Obraz 4">
+            <a:extLst>
+              <a:ext uri="{FF2B5EF4-FFF2-40B4-BE49-F238E27FC236}">
+                <a16:creationId xmlns:a16="http://schemas.microsoft.com/office/drawing/2014/main" id="{36777ECA-F800-E84B-00E3-56A11A905D3D}"/>
+              </a:ext>
+            </a:extLst>
+          </p:cNvPr>
+          <p:cNvPicPr>
+            <a:picLocks noChangeAspect="1"/>
+          </p:cNvPicPr>
+          <p:nvPr/>
+        </p:nvPicPr>
+        <p:blipFill>
+          <a:blip r:embed="rId2"/>
+          <a:stretch>
+            <a:fillRect/>
+          </a:stretch>
+        </p:blipFill>
+        <p:spPr>
+          <a:xfrm>
+            <a:off x="2809706" y="1577880"/>
+            <a:ext cx="6572588" cy="3702240"/>
+          </a:xfrm>
+          <a:prstGeom prst="rect">
+            <a:avLst/>
+          </a:prstGeom>
+        </p:spPr>
+      </p:pic>
+    </p:spTree>
+    <p:extLst>
+      <p:ext uri="{BB962C8B-B14F-4D97-AF65-F5344CB8AC3E}">
+        <p14:creationId xmlns:p14="http://schemas.microsoft.com/office/powerpoint/2010/main" val="1092773338"/>
+      </p:ext>
+    </p:extLst>
+  </p:cSld>
+  <p:clrMapOvr>
+    <a:masterClrMapping/>
+  </p:clrMapOvr>
+</p:sld>
+</file>
+
+<file path=ppt/slides/slide29.xml><?xml version="1.0" encoding="utf-8"?>
+<p:sld xmlns:a="http://schemas.openxmlformats.org/drawingml/2006/main" xmlns:r="http://schemas.openxmlformats.org/officeDocument/2006/relationships" xmlns:p="http://schemas.openxmlformats.org/presentationml/2006/main">
+  <p:cSld>
+    <p:spTree>
+      <p:nvGrpSpPr>
+        <p:cNvPr id="1" name=""/>
+        <p:cNvGrpSpPr/>
+        <p:nvPr/>
+      </p:nvGrpSpPr>
+      <p:grpSpPr>
+        <a:xfrm>
+          <a:off x="0" y="0"/>
+          <a:ext cx="0" cy="0"/>
+          <a:chOff x="0" y="0"/>
+          <a:chExt cx="0" cy="0"/>
+        </a:xfrm>
+      </p:grpSpPr>
+      <p:sp>
+        <p:nvSpPr>
+          <p:cNvPr id="2" name="Tytuł 1">
+            <a:extLst>
+              <a:ext uri="{FF2B5EF4-FFF2-40B4-BE49-F238E27FC236}">
+                <a16:creationId xmlns:a16="http://schemas.microsoft.com/office/drawing/2014/main" id="{079FD764-BC41-3A22-8680-95958B35D199}"/>
+              </a:ext>
+            </a:extLst>
+          </p:cNvPr>
+          <p:cNvSpPr>
+            <a:spLocks noGrp="1"/>
+          </p:cNvSpPr>
+          <p:nvPr>
+            <p:ph type="title"/>
+          </p:nvPr>
+        </p:nvSpPr>
+        <p:spPr/>
+        <p:txBody>
+          <a:bodyPr/>
+          <a:lstStyle/>
+          <a:p>
+            <a:r>
+              <a:rPr lang="pl-PL" dirty="0"/>
+              <a:t>Wykorzystanie zasobów</a:t>
+            </a:r>
+          </a:p>
+        </p:txBody>
+      </p:sp>
+      <p:pic>
+        <p:nvPicPr>
+          <p:cNvPr id="5" name="Symbol zastępczy zawartości 4">
+            <a:extLst>
+              <a:ext uri="{FF2B5EF4-FFF2-40B4-BE49-F238E27FC236}">
+                <a16:creationId xmlns:a16="http://schemas.microsoft.com/office/drawing/2014/main" id="{4EFC202F-50D4-EB87-8583-D53A9B63C079}"/>
+              </a:ext>
+            </a:extLst>
+          </p:cNvPr>
+          <p:cNvPicPr>
+            <a:picLocks noGrp="1" noChangeAspect="1"/>
+          </p:cNvPicPr>
+          <p:nvPr>
+            <p:ph idx="1"/>
+          </p:nvPr>
+        </p:nvPicPr>
+        <p:blipFill>
+          <a:blip r:embed="rId2"/>
+          <a:stretch>
+            <a:fillRect/>
+          </a:stretch>
+        </p:blipFill>
+        <p:spPr>
+          <a:xfrm>
+            <a:off x="3940064" y="2893162"/>
+            <a:ext cx="4311872" cy="2216264"/>
+          </a:xfrm>
+        </p:spPr>
+      </p:pic>
+    </p:spTree>
+    <p:extLst>
+      <p:ext uri="{BB962C8B-B14F-4D97-AF65-F5344CB8AC3E}">
+        <p14:creationId xmlns:p14="http://schemas.microsoft.com/office/powerpoint/2010/main" val="2824658018"/>
+      </p:ext>
+    </p:extLst>
+  </p:cSld>
+  <p:clrMapOvr>
+    <a:masterClrMapping/>
+  </p:clrMapOvr>
+</p:sld>
+</file>
+
 <file path=ppt/slides/slide3.xml><?xml version="1.0" encoding="utf-8"?>
 <p:sld xmlns:a="http://schemas.openxmlformats.org/drawingml/2006/main" xmlns:r="http://schemas.openxmlformats.org/officeDocument/2006/relationships" xmlns:p="http://schemas.openxmlformats.org/presentationml/2006/main">
   <p:cSld>

</xml_diff>